<commit_message>
Update Slides and Tutorial
</commit_message>
<xml_diff>
--- a/presentation/E-Portfolio.pptx
+++ b/presentation/E-Portfolio.pptx
@@ -135,18 +135,18 @@
   <pc:docChgLst>
     <pc:chgData name="Tim Koch" userId="e9f80c8ad702a9db" providerId="LiveId" clId="{88631651-9F4C-415D-9EA2-AD5AFECD7B1C}"/>
     <pc:docChg chg="undo custSel addSld delSld modSld">
-      <pc:chgData name="Tim Koch" userId="e9f80c8ad702a9db" providerId="LiveId" clId="{88631651-9F4C-415D-9EA2-AD5AFECD7B1C}" dt="2020-05-15T07:18:39.929" v="247" actId="20577"/>
+      <pc:chgData name="Tim Koch" userId="e9f80c8ad702a9db" providerId="LiveId" clId="{88631651-9F4C-415D-9EA2-AD5AFECD7B1C}" dt="2020-05-27T05:48:47.326" v="1214" actId="20577"/>
       <pc:docMkLst>
         <pc:docMk/>
       </pc:docMkLst>
       <pc:sldChg chg="modSp mod">
-        <pc:chgData name="Tim Koch" userId="e9f80c8ad702a9db" providerId="LiveId" clId="{88631651-9F4C-415D-9EA2-AD5AFECD7B1C}" dt="2020-05-15T06:54:09.108" v="61" actId="20577"/>
+        <pc:chgData name="Tim Koch" userId="e9f80c8ad702a9db" providerId="LiveId" clId="{88631651-9F4C-415D-9EA2-AD5AFECD7B1C}" dt="2020-05-27T05:43:36.963" v="478" actId="20577"/>
         <pc:sldMkLst>
           <pc:docMk/>
           <pc:sldMk cId="1601387183" sldId="257"/>
         </pc:sldMkLst>
         <pc:spChg chg="mod">
-          <ac:chgData name="Tim Koch" userId="e9f80c8ad702a9db" providerId="LiveId" clId="{88631651-9F4C-415D-9EA2-AD5AFECD7B1C}" dt="2020-05-15T06:54:09.108" v="61" actId="20577"/>
+          <ac:chgData name="Tim Koch" userId="e9f80c8ad702a9db" providerId="LiveId" clId="{88631651-9F4C-415D-9EA2-AD5AFECD7B1C}" dt="2020-05-27T05:43:36.963" v="478" actId="20577"/>
           <ac:spMkLst>
             <pc:docMk/>
             <pc:sldMk cId="1601387183" sldId="257"/>
@@ -154,8 +154,8 @@
           </ac:spMkLst>
         </pc:spChg>
       </pc:sldChg>
-      <pc:sldChg chg="modSp mod">
-        <pc:chgData name="Tim Koch" userId="e9f80c8ad702a9db" providerId="LiveId" clId="{88631651-9F4C-415D-9EA2-AD5AFECD7B1C}" dt="2020-05-12T08:05:22.944" v="4" actId="403"/>
+      <pc:sldChg chg="modSp mod modNotesTx">
+        <pc:chgData name="Tim Koch" userId="e9f80c8ad702a9db" providerId="LiveId" clId="{88631651-9F4C-415D-9EA2-AD5AFECD7B1C}" dt="2020-05-27T05:46:50.847" v="974" actId="20577"/>
         <pc:sldMkLst>
           <pc:docMk/>
           <pc:sldMk cId="3327566961" sldId="258"/>
@@ -169,8 +169,8 @@
           </ac:spMkLst>
         </pc:spChg>
       </pc:sldChg>
-      <pc:sldChg chg="modSp mod">
-        <pc:chgData name="Tim Koch" userId="e9f80c8ad702a9db" providerId="LiveId" clId="{88631651-9F4C-415D-9EA2-AD5AFECD7B1C}" dt="2020-05-12T08:05:12.069" v="2" actId="403"/>
+      <pc:sldChg chg="modSp mod modNotesTx">
+        <pc:chgData name="Tim Koch" userId="e9f80c8ad702a9db" providerId="LiveId" clId="{88631651-9F4C-415D-9EA2-AD5AFECD7B1C}" dt="2020-05-27T05:48:47.326" v="1214" actId="20577"/>
         <pc:sldMkLst>
           <pc:docMk/>
           <pc:sldMk cId="1597957375" sldId="260"/>
@@ -181,6 +181,14 @@
             <pc:docMk/>
             <pc:sldMk cId="1597957375" sldId="260"/>
             <ac:spMk id="3" creationId="{14019A5B-9FD0-42AD-A247-93C4424D9066}"/>
+          </ac:spMkLst>
+        </pc:spChg>
+        <pc:spChg chg="mod">
+          <ac:chgData name="Tim Koch" userId="e9f80c8ad702a9db" providerId="LiveId" clId="{88631651-9F4C-415D-9EA2-AD5AFECD7B1C}" dt="2020-05-27T05:43:25.721" v="456" actId="20577"/>
+          <ac:spMkLst>
+            <pc:docMk/>
+            <pc:sldMk cId="1597957375" sldId="260"/>
+            <ac:spMk id="5" creationId="{BDB52A6D-B96E-4B8D-9A20-9C8623C99BFD}"/>
           </ac:spMkLst>
         </pc:spChg>
       </pc:sldChg>
@@ -199,8 +207,8 @@
           </ac:spMkLst>
         </pc:spChg>
       </pc:sldChg>
-      <pc:sldChg chg="modSp add mod">
-        <pc:chgData name="Tim Koch" userId="e9f80c8ad702a9db" providerId="LiveId" clId="{88631651-9F4C-415D-9EA2-AD5AFECD7B1C}" dt="2020-05-15T07:18:39.929" v="247" actId="20577"/>
+      <pc:sldChg chg="modSp add mod modNotesTx">
+        <pc:chgData name="Tim Koch" userId="e9f80c8ad702a9db" providerId="LiveId" clId="{88631651-9F4C-415D-9EA2-AD5AFECD7B1C}" dt="2020-05-27T05:47:21.306" v="1034" actId="20577"/>
         <pc:sldMkLst>
           <pc:docMk/>
           <pc:sldMk cId="572174054" sldId="264"/>
@@ -316,7 +324,7 @@
           <a:p>
             <a:fld id="{3C5F663C-A577-4B50-83DC-3888C3627807}" type="datetimeFigureOut">
               <a:rPr lang="de-DE" smtClean="0"/>
-              <a:t>15.05.2020</a:t>
+              <a:t>27.05.2020</a:t>
             </a:fld>
             <a:endParaRPr lang="de-DE"/>
           </a:p>
@@ -629,6 +637,377 @@
           <a:p>
             <a:r>
               <a:rPr lang="de-DE" dirty="0"/>
+              <a:t>API Client</a:t>
+            </a:r>
+          </a:p>
+          <a:p>
+            <a:r>
+              <a:rPr lang="de-DE" dirty="0"/>
+              <a:t>Es können </a:t>
+            </a:r>
+            <a:r>
+              <a:rPr lang="de-DE" dirty="0" err="1"/>
+              <a:t>Requests</a:t>
+            </a:r>
+            <a:r>
+              <a:rPr lang="de-DE" dirty="0"/>
+              <a:t> erstellt werden (auch andere als GET)</a:t>
+            </a:r>
+          </a:p>
+          <a:p>
+            <a:r>
+              <a:rPr lang="de-DE" dirty="0"/>
+              <a:t>Postman kann für viele APIs verwendet werden</a:t>
+            </a:r>
+          </a:p>
+          <a:p>
+            <a:r>
+              <a:rPr lang="de-DE" dirty="0"/>
+              <a:t>Die Rückgabe kann einfach analysiert werden</a:t>
+            </a:r>
+          </a:p>
+          <a:p>
+            <a:r>
+              <a:rPr lang="de-DE" dirty="0"/>
+              <a:t>Es können Test Suiten erstellt werden, die auch automatisches Testen unterstützen</a:t>
+            </a:r>
+          </a:p>
+          <a:p>
+            <a:r>
+              <a:rPr lang="de-DE" dirty="0"/>
+              <a:t>Tests können einfach innerhalb eines Teams geteilt werden</a:t>
+            </a:r>
+          </a:p>
+          <a:p>
+            <a:endParaRPr lang="de-DE" dirty="0"/>
+          </a:p>
+          <a:p>
+            <a:r>
+              <a:rPr lang="de-DE" dirty="0"/>
+              <a:t>Man kann auch APIs erstellen </a:t>
+            </a:r>
+          </a:p>
+          <a:p>
+            <a:r>
+              <a:rPr lang="de-DE" dirty="0"/>
+              <a:t>Dokumentationen für APIs werden ebenfalls angeboten</a:t>
+            </a:r>
+          </a:p>
+        </p:txBody>
+      </p:sp>
+      <p:sp>
+        <p:nvSpPr>
+          <p:cNvPr id="4" name="Foliennummernplatzhalter 3"/>
+          <p:cNvSpPr>
+            <a:spLocks noGrp="1"/>
+          </p:cNvSpPr>
+          <p:nvPr>
+            <p:ph type="sldNum" sz="quarter" idx="5"/>
+          </p:nvPr>
+        </p:nvSpPr>
+        <p:spPr/>
+        <p:txBody>
+          <a:bodyPr/>
+          <a:lstStyle/>
+          <a:p>
+            <a:fld id="{4313C893-E3AB-42E7-B95A-C24A742A3B27}" type="slidenum">
+              <a:rPr lang="de-DE" smtClean="0"/>
+              <a:t>3</a:t>
+            </a:fld>
+            <a:endParaRPr lang="de-DE"/>
+          </a:p>
+        </p:txBody>
+      </p:sp>
+    </p:spTree>
+    <p:extLst>
+      <p:ext uri="{BB962C8B-B14F-4D97-AF65-F5344CB8AC3E}">
+        <p14:creationId xmlns:p14="http://schemas.microsoft.com/office/powerpoint/2010/main" val="3941527977"/>
+      </p:ext>
+    </p:extLst>
+  </p:cSld>
+  <p:clrMapOvr>
+    <a:masterClrMapping/>
+  </p:clrMapOvr>
+</p:notes>
+</file>
+
+<file path=ppt/notesSlides/notesSlide2.xml><?xml version="1.0" encoding="utf-8"?>
+<p:notes xmlns:a="http://schemas.openxmlformats.org/drawingml/2006/main" xmlns:r="http://schemas.openxmlformats.org/officeDocument/2006/relationships" xmlns:p="http://schemas.openxmlformats.org/presentationml/2006/main">
+  <p:cSld>
+    <p:spTree>
+      <p:nvGrpSpPr>
+        <p:cNvPr id="1" name=""/>
+        <p:cNvGrpSpPr/>
+        <p:nvPr/>
+      </p:nvGrpSpPr>
+      <p:grpSpPr>
+        <a:xfrm>
+          <a:off x="0" y="0"/>
+          <a:ext cx="0" cy="0"/>
+          <a:chOff x="0" y="0"/>
+          <a:chExt cx="0" cy="0"/>
+        </a:xfrm>
+      </p:grpSpPr>
+      <p:sp>
+        <p:nvSpPr>
+          <p:cNvPr id="2" name="Folienbildplatzhalter 1"/>
+          <p:cNvSpPr>
+            <a:spLocks noGrp="1" noRot="1" noChangeAspect="1"/>
+          </p:cNvSpPr>
+          <p:nvPr>
+            <p:ph type="sldImg"/>
+          </p:nvPr>
+        </p:nvSpPr>
+        <p:spPr/>
+      </p:sp>
+      <p:sp>
+        <p:nvSpPr>
+          <p:cNvPr id="3" name="Notizenplatzhalter 2"/>
+          <p:cNvSpPr>
+            <a:spLocks noGrp="1"/>
+          </p:cNvSpPr>
+          <p:nvPr>
+            <p:ph type="body" idx="1"/>
+          </p:nvPr>
+        </p:nvSpPr>
+        <p:spPr/>
+        <p:txBody>
+          <a:bodyPr/>
+          <a:lstStyle/>
+          <a:p>
+            <a:r>
+              <a:rPr lang="de-DE" dirty="0"/>
+              <a:t>Grafisch einfaches API </a:t>
+            </a:r>
+            <a:r>
+              <a:rPr lang="de-DE" dirty="0" err="1"/>
+              <a:t>Testing</a:t>
+            </a:r>
+            <a:endParaRPr lang="de-DE" dirty="0"/>
+          </a:p>
+          <a:p>
+            <a:r>
+              <a:rPr lang="de-DE" dirty="0"/>
+              <a:t>Automation durch Monitore</a:t>
+            </a:r>
+          </a:p>
+          <a:p>
+            <a:r>
+              <a:rPr lang="de-DE" dirty="0"/>
+              <a:t>Tests für Rückgaben, HTTP Statuscodes, JSON Rückgaben, Variablen </a:t>
+            </a:r>
+            <a:r>
+              <a:rPr lang="de-DE" dirty="0" err="1"/>
+              <a:t>etc</a:t>
+            </a:r>
+            <a:endParaRPr lang="de-DE" dirty="0"/>
+          </a:p>
+          <a:p>
+            <a:r>
+              <a:rPr lang="de-DE" dirty="0"/>
+              <a:t>Variablen können auch im Request Body übergeben werden</a:t>
+            </a:r>
+          </a:p>
+        </p:txBody>
+      </p:sp>
+      <p:sp>
+        <p:nvSpPr>
+          <p:cNvPr id="4" name="Foliennummernplatzhalter 3"/>
+          <p:cNvSpPr>
+            <a:spLocks noGrp="1"/>
+          </p:cNvSpPr>
+          <p:nvPr>
+            <p:ph type="sldNum" sz="quarter" idx="5"/>
+          </p:nvPr>
+        </p:nvSpPr>
+        <p:spPr/>
+        <p:txBody>
+          <a:bodyPr/>
+          <a:lstStyle/>
+          <a:p>
+            <a:fld id="{4313C893-E3AB-42E7-B95A-C24A742A3B27}" type="slidenum">
+              <a:rPr lang="de-DE" smtClean="0"/>
+              <a:t>4</a:t>
+            </a:fld>
+            <a:endParaRPr lang="de-DE"/>
+          </a:p>
+        </p:txBody>
+      </p:sp>
+    </p:spTree>
+    <p:extLst>
+      <p:ext uri="{BB962C8B-B14F-4D97-AF65-F5344CB8AC3E}">
+        <p14:creationId xmlns:p14="http://schemas.microsoft.com/office/powerpoint/2010/main" val="2540283408"/>
+      </p:ext>
+    </p:extLst>
+  </p:cSld>
+  <p:clrMapOvr>
+    <a:masterClrMapping/>
+  </p:clrMapOvr>
+</p:notes>
+</file>
+
+<file path=ppt/notesSlides/notesSlide3.xml><?xml version="1.0" encoding="utf-8"?>
+<p:notes xmlns:a="http://schemas.openxmlformats.org/drawingml/2006/main" xmlns:r="http://schemas.openxmlformats.org/officeDocument/2006/relationships" xmlns:p="http://schemas.openxmlformats.org/presentationml/2006/main">
+  <p:cSld>
+    <p:spTree>
+      <p:nvGrpSpPr>
+        <p:cNvPr id="1" name=""/>
+        <p:cNvGrpSpPr/>
+        <p:nvPr/>
+      </p:nvGrpSpPr>
+      <p:grpSpPr>
+        <a:xfrm>
+          <a:off x="0" y="0"/>
+          <a:ext cx="0" cy="0"/>
+          <a:chOff x="0" y="0"/>
+          <a:chExt cx="0" cy="0"/>
+        </a:xfrm>
+      </p:grpSpPr>
+      <p:sp>
+        <p:nvSpPr>
+          <p:cNvPr id="2" name="Folienbildplatzhalter 1"/>
+          <p:cNvSpPr>
+            <a:spLocks noGrp="1" noRot="1" noChangeAspect="1"/>
+          </p:cNvSpPr>
+          <p:nvPr>
+            <p:ph type="sldImg"/>
+          </p:nvPr>
+        </p:nvSpPr>
+        <p:spPr/>
+      </p:sp>
+      <p:sp>
+        <p:nvSpPr>
+          <p:cNvPr id="3" name="Notizenplatzhalter 2"/>
+          <p:cNvSpPr>
+            <a:spLocks noGrp="1"/>
+          </p:cNvSpPr>
+          <p:nvPr>
+            <p:ph type="body" idx="1"/>
+          </p:nvPr>
+        </p:nvSpPr>
+        <p:spPr/>
+        <p:txBody>
+          <a:bodyPr/>
+          <a:lstStyle/>
+          <a:p>
+            <a:r>
+              <a:rPr lang="de-DE" dirty="0"/>
+              <a:t>Collections zum Gruppieren der </a:t>
+            </a:r>
+            <a:r>
+              <a:rPr lang="de-DE" dirty="0" err="1"/>
+              <a:t>Requests</a:t>
+            </a:r>
+            <a:r>
+              <a:rPr lang="de-DE" dirty="0"/>
+              <a:t> für die verschiedenen APIs</a:t>
+            </a:r>
+          </a:p>
+          <a:p>
+            <a:r>
+              <a:rPr lang="de-DE" dirty="0"/>
+              <a:t>GET PUT POST DELETE (PATCH etc.)</a:t>
+            </a:r>
+          </a:p>
+          <a:p>
+            <a:r>
+              <a:rPr lang="de-DE" dirty="0"/>
+              <a:t>Monitore zur Automation der Abfragen</a:t>
+            </a:r>
+          </a:p>
+          <a:p>
+            <a:r>
+              <a:rPr lang="de-DE" dirty="0"/>
+              <a:t>Scheduling</a:t>
+            </a:r>
+          </a:p>
+          <a:p>
+            <a:endParaRPr lang="de-DE" dirty="0"/>
+          </a:p>
+        </p:txBody>
+      </p:sp>
+      <p:sp>
+        <p:nvSpPr>
+          <p:cNvPr id="4" name="Foliennummernplatzhalter 3"/>
+          <p:cNvSpPr>
+            <a:spLocks noGrp="1"/>
+          </p:cNvSpPr>
+          <p:nvPr>
+            <p:ph type="sldNum" sz="quarter" idx="5"/>
+          </p:nvPr>
+        </p:nvSpPr>
+        <p:spPr/>
+        <p:txBody>
+          <a:bodyPr/>
+          <a:lstStyle/>
+          <a:p>
+            <a:fld id="{4313C893-E3AB-42E7-B95A-C24A742A3B27}" type="slidenum">
+              <a:rPr lang="de-DE" smtClean="0"/>
+              <a:t>5</a:t>
+            </a:fld>
+            <a:endParaRPr lang="de-DE"/>
+          </a:p>
+        </p:txBody>
+      </p:sp>
+    </p:spTree>
+    <p:extLst>
+      <p:ext uri="{BB962C8B-B14F-4D97-AF65-F5344CB8AC3E}">
+        <p14:creationId xmlns:p14="http://schemas.microsoft.com/office/powerpoint/2010/main" val="2197637286"/>
+      </p:ext>
+    </p:extLst>
+  </p:cSld>
+  <p:clrMapOvr>
+    <a:masterClrMapping/>
+  </p:clrMapOvr>
+</p:notes>
+</file>
+
+<file path=ppt/notesSlides/notesSlide4.xml><?xml version="1.0" encoding="utf-8"?>
+<p:notes xmlns:a="http://schemas.openxmlformats.org/drawingml/2006/main" xmlns:r="http://schemas.openxmlformats.org/officeDocument/2006/relationships" xmlns:p="http://schemas.openxmlformats.org/presentationml/2006/main">
+  <p:cSld>
+    <p:spTree>
+      <p:nvGrpSpPr>
+        <p:cNvPr id="1" name=""/>
+        <p:cNvGrpSpPr/>
+        <p:nvPr/>
+      </p:nvGrpSpPr>
+      <p:grpSpPr>
+        <a:xfrm>
+          <a:off x="0" y="0"/>
+          <a:ext cx="0" cy="0"/>
+          <a:chOff x="0" y="0"/>
+          <a:chExt cx="0" cy="0"/>
+        </a:xfrm>
+      </p:grpSpPr>
+      <p:sp>
+        <p:nvSpPr>
+          <p:cNvPr id="2" name="Folienbildplatzhalter 1"/>
+          <p:cNvSpPr>
+            <a:spLocks noGrp="1" noRot="1" noChangeAspect="1"/>
+          </p:cNvSpPr>
+          <p:nvPr>
+            <p:ph type="sldImg"/>
+          </p:nvPr>
+        </p:nvSpPr>
+        <p:spPr/>
+      </p:sp>
+      <p:sp>
+        <p:nvSpPr>
+          <p:cNvPr id="3" name="Notizenplatzhalter 2"/>
+          <p:cNvSpPr>
+            <a:spLocks noGrp="1"/>
+          </p:cNvSpPr>
+          <p:nvPr>
+            <p:ph type="body" idx="1"/>
+          </p:nvPr>
+        </p:nvSpPr>
+        <p:spPr/>
+        <p:txBody>
+          <a:bodyPr/>
+          <a:lstStyle/>
+          <a:p>
+            <a:r>
+              <a:rPr lang="de-DE" dirty="0"/>
               <a:t>Free für Entwickler -&gt; für Private </a:t>
             </a:r>
             <a:r>
@@ -2153,7 +2532,7 @@
           <a:p>
             <a:fld id="{ED291B17-9318-49DB-B28B-6E5994AE9581}" type="datetime1">
               <a:rPr lang="en-US" smtClean="0"/>
-              <a:t>5/15/2020</a:t>
+              <a:t>5/27/2020</a:t>
             </a:fld>
             <a:endParaRPr lang="en-US" dirty="0"/>
           </a:p>
@@ -3613,7 +3992,7 @@
           <a:p>
             <a:fld id="{ED291B17-9318-49DB-B28B-6E5994AE9581}" type="datetime1">
               <a:rPr lang="en-US" smtClean="0"/>
-              <a:t>5/15/2020</a:t>
+              <a:t>5/27/2020</a:t>
             </a:fld>
             <a:endParaRPr lang="en-US" dirty="0"/>
           </a:p>
@@ -5067,7 +5446,7 @@
           <a:p>
             <a:fld id="{ED291B17-9318-49DB-B28B-6E5994AE9581}" type="datetime1">
               <a:rPr lang="en-US" smtClean="0"/>
-              <a:t>5/15/2020</a:t>
+              <a:t>5/27/2020</a:t>
             </a:fld>
             <a:endParaRPr lang="en-US" dirty="0"/>
           </a:p>
@@ -5253,7 +5632,7 @@
           <a:p>
             <a:fld id="{ED291B17-9318-49DB-B28B-6E5994AE9581}" type="datetime1">
               <a:rPr lang="en-US" smtClean="0"/>
-              <a:t>5/15/2020</a:t>
+              <a:t>5/27/2020</a:t>
             </a:fld>
             <a:endParaRPr lang="en-US" dirty="0"/>
           </a:p>
@@ -6699,7 +7078,7 @@
           <a:p>
             <a:fld id="{ED291B17-9318-49DB-B28B-6E5994AE9581}" type="datetime1">
               <a:rPr lang="en-US" smtClean="0"/>
-              <a:t>5/15/2020</a:t>
+              <a:t>5/27/2020</a:t>
             </a:fld>
             <a:endParaRPr lang="en-US" dirty="0"/>
           </a:p>
@@ -8208,7 +8587,7 @@
           <a:p>
             <a:fld id="{ED291B17-9318-49DB-B28B-6E5994AE9581}" type="datetime1">
               <a:rPr lang="en-US" smtClean="0"/>
-              <a:t>5/15/2020</a:t>
+              <a:t>5/27/2020</a:t>
             </a:fld>
             <a:endParaRPr lang="en-US" dirty="0"/>
           </a:p>
@@ -9730,7 +10109,7 @@
           <a:p>
             <a:fld id="{ED291B17-9318-49DB-B28B-6E5994AE9581}" type="datetime1">
               <a:rPr lang="en-US" smtClean="0"/>
-              <a:t>5/15/2020</a:t>
+              <a:t>5/27/2020</a:t>
             </a:fld>
             <a:endParaRPr lang="en-US" dirty="0"/>
           </a:p>
@@ -11396,7 +11775,7 @@
           <a:p>
             <a:fld id="{ED291B17-9318-49DB-B28B-6E5994AE9581}" type="datetime1">
               <a:rPr lang="en-US" smtClean="0"/>
-              <a:t>5/15/2020</a:t>
+              <a:t>5/27/2020</a:t>
             </a:fld>
             <a:endParaRPr lang="en-US" dirty="0"/>
           </a:p>
@@ -12795,7 +13174,7 @@
           <a:p>
             <a:fld id="{ED291B17-9318-49DB-B28B-6E5994AE9581}" type="datetime1">
               <a:rPr lang="en-US" smtClean="0"/>
-              <a:t>5/15/2020</a:t>
+              <a:t>5/27/2020</a:t>
             </a:fld>
             <a:endParaRPr lang="en-US" dirty="0"/>
           </a:p>
@@ -12896,7 +13275,7 @@
           <a:p>
             <a:fld id="{ED291B17-9318-49DB-B28B-6E5994AE9581}" type="datetime1">
               <a:rPr lang="en-US" smtClean="0"/>
-              <a:t>5/15/2020</a:t>
+              <a:t>5/27/2020</a:t>
             </a:fld>
             <a:endParaRPr lang="en-US" dirty="0"/>
           </a:p>
@@ -14423,7 +14802,7 @@
           <a:p>
             <a:fld id="{ED291B17-9318-49DB-B28B-6E5994AE9581}" type="datetime1">
               <a:rPr lang="en-US" smtClean="0"/>
-              <a:t>5/15/2020</a:t>
+              <a:t>5/27/2020</a:t>
             </a:fld>
             <a:endParaRPr lang="en-US" dirty="0"/>
           </a:p>
@@ -15960,7 +16339,7 @@
           <a:p>
             <a:fld id="{ED291B17-9318-49DB-B28B-6E5994AE9581}" type="datetime1">
               <a:rPr lang="en-US" smtClean="0"/>
-              <a:t>5/15/2020</a:t>
+              <a:t>5/27/2020</a:t>
             </a:fld>
             <a:endParaRPr lang="en-US" dirty="0"/>
           </a:p>
@@ -16184,7 +16563,7 @@
           <a:p>
             <a:fld id="{ED291B17-9318-49DB-B28B-6E5994AE9581}" type="datetime1">
               <a:rPr lang="en-US" smtClean="0"/>
-              <a:t>5/15/2020</a:t>
+              <a:t>5/27/2020</a:t>
             </a:fld>
             <a:endParaRPr lang="en-US" dirty="0"/>
           </a:p>
@@ -18393,7 +18772,10 @@
               <a:rPr lang="de-DE" sz="2800" dirty="0" err="1"/>
               <a:t>To</a:t>
             </a:r>
-            <a:endParaRPr lang="de-DE" sz="2800" dirty="0"/>
+            <a:r>
+              <a:rPr lang="de-DE" sz="2800" dirty="0"/>
+              <a:t> / Best Practice</a:t>
+            </a:r>
           </a:p>
           <a:p>
             <a:r>
@@ -23717,11 +24099,14 @@
               </a:rPr>
               <a:t>To</a:t>
             </a:r>
-            <a:endParaRPr lang="de-DE" sz="3600" dirty="0">
-              <a:solidFill>
-                <a:schemeClr val="accent1"/>
-              </a:solidFill>
-            </a:endParaRPr>
+            <a:r>
+              <a:rPr lang="de-DE" sz="3600" dirty="0">
+                <a:solidFill>
+                  <a:schemeClr val="accent1"/>
+                </a:solidFill>
+              </a:rPr>
+              <a:t> / Best Practice</a:t>
+            </a:r>
           </a:p>
         </p:txBody>
       </p:sp>

</xml_diff>